<commit_message>
finishing touches to ppt
Signed-off-by: unknown <AIDAN@AIDAN-PC.(none)>
</commit_message>
<xml_diff>
--- a/AD Coding Competition.pptx
+++ b/AD Coding Competition.pptx
@@ -5,10 +5,10 @@
     <p:sldMasterId id="2147483660" r:id="rId5"/>
   </p:sldMasterIdLst>
   <p:notesMasterIdLst>
-    <p:notesMasterId r:id="rId11"/>
+    <p:notesMasterId r:id="rId15"/>
   </p:notesMasterIdLst>
   <p:handoutMasterIdLst>
-    <p:handoutMasterId r:id="rId12"/>
+    <p:handoutMasterId r:id="rId16"/>
   </p:handoutMasterIdLst>
   <p:sldIdLst>
     <p:sldId id="256" r:id="rId6"/>
@@ -16,6 +16,10 @@
     <p:sldId id="257" r:id="rId8"/>
     <p:sldId id="261" r:id="rId9"/>
     <p:sldId id="258" r:id="rId10"/>
+    <p:sldId id="262" r:id="rId11"/>
+    <p:sldId id="263" r:id="rId12"/>
+    <p:sldId id="264" r:id="rId13"/>
+    <p:sldId id="265" r:id="rId14"/>
   </p:sldIdLst>
   <p:sldSz cx="9144000" cy="6858000" type="screen4x3"/>
   <p:notesSz cx="7099300" cy="10234613"/>
@@ -3709,11 +3713,7 @@
           <a:p>
             <a:r>
               <a:rPr lang="en-AU" dirty="0" smtClean="0"/>
-              <a:t>It’s all </a:t>
-            </a:r>
-            <a:r>
-              <a:rPr lang="en-AU" dirty="0" smtClean="0"/>
-              <a:t>about….</a:t>
+              <a:t>It’s all about….</a:t>
             </a:r>
             <a:endParaRPr lang="en-AU" dirty="0"/>
           </a:p>
@@ -4398,11 +4398,7 @@
           <a:p>
             <a:r>
               <a:rPr lang="en-AU" sz="2400" b="1" dirty="0"/>
-              <a:t>https</a:t>
-            </a:r>
-            <a:r>
-              <a:rPr lang="en-AU" sz="2400" b="1" dirty="0"/>
-              <a:t>://github.com/ptpavankumar/Competition</a:t>
+              <a:t>https://github.com/ptpavankumar/Competition</a:t>
             </a:r>
           </a:p>
         </p:txBody>
@@ -5199,6 +5195,965 @@
             </p:seq>
           </p:childTnLst>
         </p:cTn>
+      </p:par>
+    </p:tnLst>
+  </p:timing>
+</p:sld>
+</file>
+
+<file path=ppt/slides/slide6.xml><?xml version="1.0" encoding="utf-8"?>
+<p:sld xmlns:a="http://schemas.openxmlformats.org/drawingml/2006/main" xmlns:r="http://schemas.openxmlformats.org/officeDocument/2006/relationships" xmlns:p="http://schemas.openxmlformats.org/presentationml/2006/main">
+  <p:cSld>
+    <p:spTree>
+      <p:nvGrpSpPr>
+        <p:cNvPr id="1" name=""/>
+        <p:cNvGrpSpPr/>
+        <p:nvPr/>
+      </p:nvGrpSpPr>
+      <p:grpSpPr>
+        <a:xfrm>
+          <a:off x="0" y="0"/>
+          <a:ext cx="0" cy="0"/>
+          <a:chOff x="0" y="0"/>
+          <a:chExt cx="0" cy="0"/>
+        </a:xfrm>
+      </p:grpSpPr>
+      <p:sp>
+        <p:nvSpPr>
+          <p:cNvPr id="2" name="Title 1"/>
+          <p:cNvSpPr>
+            <a:spLocks noGrp="1"/>
+          </p:cNvSpPr>
+          <p:nvPr>
+            <p:ph type="title"/>
+          </p:nvPr>
+        </p:nvSpPr>
+        <p:spPr/>
+        <p:txBody>
+          <a:bodyPr/>
+          <a:lstStyle/>
+          <a:p>
+            <a:r>
+              <a:rPr lang="en-AU" dirty="0" smtClean="0"/>
+              <a:t>Key Note ! </a:t>
+            </a:r>
+            <a:endParaRPr lang="en-AU" dirty="0"/>
+          </a:p>
+        </p:txBody>
+      </p:sp>
+    </p:spTree>
+    <p:extLst>
+      <p:ext uri="{BB962C8B-B14F-4D97-AF65-F5344CB8AC3E}">
+        <p14:creationId xmlns:p14="http://schemas.microsoft.com/office/powerpoint/2010/main" val="2862675545"/>
+      </p:ext>
+    </p:extLst>
+  </p:cSld>
+  <p:clrMapOvr>
+    <a:masterClrMapping/>
+  </p:clrMapOvr>
+  <p:transition>
+    <p:fade thruBlk="1"/>
+  </p:transition>
+  <p:timing>
+    <p:tnLst>
+      <p:par>
+        <p:cTn id="1" dur="indefinite" restart="never" nodeType="tmRoot"/>
+      </p:par>
+    </p:tnLst>
+  </p:timing>
+</p:sld>
+</file>
+
+<file path=ppt/slides/slide7.xml><?xml version="1.0" encoding="utf-8"?>
+<p:sld xmlns:a="http://schemas.openxmlformats.org/drawingml/2006/main" xmlns:r="http://schemas.openxmlformats.org/officeDocument/2006/relationships" xmlns:p="http://schemas.openxmlformats.org/presentationml/2006/main">
+  <p:cSld>
+    <p:spTree>
+      <p:nvGrpSpPr>
+        <p:cNvPr id="1" name=""/>
+        <p:cNvGrpSpPr/>
+        <p:nvPr/>
+      </p:nvGrpSpPr>
+      <p:grpSpPr>
+        <a:xfrm>
+          <a:off x="0" y="0"/>
+          <a:ext cx="0" cy="0"/>
+          <a:chOff x="0" y="0"/>
+          <a:chExt cx="0" cy="0"/>
+        </a:xfrm>
+      </p:grpSpPr>
+      <p:sp>
+        <p:nvSpPr>
+          <p:cNvPr id="2" name="Title 1"/>
+          <p:cNvSpPr>
+            <a:spLocks noGrp="1"/>
+          </p:cNvSpPr>
+          <p:nvPr>
+            <p:ph type="title"/>
+          </p:nvPr>
+        </p:nvSpPr>
+        <p:spPr/>
+        <p:txBody>
+          <a:bodyPr/>
+          <a:lstStyle/>
+          <a:p>
+            <a:r>
+              <a:rPr lang="en-AU" dirty="0" smtClean="0"/>
+              <a:t>FAQ</a:t>
+            </a:r>
+            <a:endParaRPr lang="en-AU" dirty="0"/>
+          </a:p>
+        </p:txBody>
+      </p:sp>
+      <p:sp>
+        <p:nvSpPr>
+          <p:cNvPr id="3" name="Text Placeholder 2"/>
+          <p:cNvSpPr>
+            <a:spLocks noGrp="1"/>
+          </p:cNvSpPr>
+          <p:nvPr>
+            <p:ph type="body" sz="quarter" idx="10"/>
+          </p:nvPr>
+        </p:nvSpPr>
+        <p:spPr/>
+        <p:txBody>
+          <a:bodyPr/>
+          <a:lstStyle/>
+          <a:p>
+            <a:r>
+              <a:rPr lang="en-AU" b="1" dirty="0">
+                <a:solidFill>
+                  <a:srgbClr val="FF0000"/>
+                </a:solidFill>
+              </a:rPr>
+              <a:t>How long will the competition run for</a:t>
+            </a:r>
+            <a:r>
+              <a:rPr lang="en-AU" b="1" dirty="0" smtClean="0">
+                <a:solidFill>
+                  <a:srgbClr val="FF0000"/>
+                </a:solidFill>
+              </a:rPr>
+              <a:t>?</a:t>
+            </a:r>
+            <a:endParaRPr lang="en-AU" dirty="0">
+              <a:solidFill>
+                <a:srgbClr val="FF0000"/>
+              </a:solidFill>
+            </a:endParaRPr>
+          </a:p>
+          <a:p>
+            <a:r>
+              <a:rPr lang="en-AU" b="1" dirty="0">
+                <a:solidFill>
+                  <a:srgbClr val="FF0000"/>
+                </a:solidFill>
+              </a:rPr>
+              <a:t>What’s the prize?</a:t>
+            </a:r>
+            <a:endParaRPr lang="en-AU" dirty="0">
+              <a:solidFill>
+                <a:srgbClr val="FF0000"/>
+              </a:solidFill>
+            </a:endParaRPr>
+          </a:p>
+          <a:p>
+            <a:r>
+              <a:rPr lang="en-AU" b="1" dirty="0">
+                <a:solidFill>
+                  <a:srgbClr val="FF0000"/>
+                </a:solidFill>
+              </a:rPr>
+              <a:t>Who are the judges?</a:t>
+            </a:r>
+            <a:endParaRPr lang="en-AU" dirty="0">
+              <a:solidFill>
+                <a:srgbClr val="FF0000"/>
+              </a:solidFill>
+            </a:endParaRPr>
+          </a:p>
+          <a:p>
+            <a:r>
+              <a:rPr lang="en-AU" b="1" dirty="0">
+                <a:solidFill>
+                  <a:srgbClr val="FF0000"/>
+                </a:solidFill>
+              </a:rPr>
+              <a:t>Who can enter?</a:t>
+            </a:r>
+            <a:endParaRPr lang="en-AU" dirty="0">
+              <a:solidFill>
+                <a:srgbClr val="FF0000"/>
+              </a:solidFill>
+            </a:endParaRPr>
+          </a:p>
+          <a:p>
+            <a:r>
+              <a:rPr lang="en-AU" b="1" dirty="0">
+                <a:solidFill>
+                  <a:srgbClr val="FF0000"/>
+                </a:solidFill>
+              </a:rPr>
+              <a:t>So how much will it costs me to build my app?</a:t>
+            </a:r>
+            <a:endParaRPr lang="en-AU" dirty="0">
+              <a:solidFill>
+                <a:srgbClr val="FF0000"/>
+              </a:solidFill>
+            </a:endParaRPr>
+          </a:p>
+          <a:p>
+            <a:r>
+              <a:rPr lang="en-AU" b="1" dirty="0">
+                <a:solidFill>
+                  <a:srgbClr val="FF0000"/>
+                </a:solidFill>
+              </a:rPr>
+              <a:t>When will I get time to build my app</a:t>
+            </a:r>
+            <a:r>
+              <a:rPr lang="en-AU" b="1" dirty="0" smtClean="0">
+                <a:solidFill>
+                  <a:srgbClr val="FF0000"/>
+                </a:solidFill>
+              </a:rPr>
+              <a:t>?</a:t>
+            </a:r>
+            <a:endParaRPr lang="en-AU" dirty="0">
+              <a:solidFill>
+                <a:srgbClr val="FF0000"/>
+              </a:solidFill>
+            </a:endParaRPr>
+          </a:p>
+        </p:txBody>
+      </p:sp>
+    </p:spTree>
+    <p:extLst>
+      <p:ext uri="{BB962C8B-B14F-4D97-AF65-F5344CB8AC3E}">
+        <p14:creationId xmlns:p14="http://schemas.microsoft.com/office/powerpoint/2010/main" val="2529570385"/>
+      </p:ext>
+    </p:extLst>
+  </p:cSld>
+  <p:clrMapOvr>
+    <a:masterClrMapping/>
+  </p:clrMapOvr>
+  <p:transition>
+    <p:fade thruBlk="1"/>
+  </p:transition>
+  <p:timing>
+    <p:tnLst>
+      <p:par>
+        <p:cTn id="1" dur="indefinite" restart="never" nodeType="tmRoot">
+          <p:childTnLst>
+            <p:seq concurrent="1" nextAc="seek">
+              <p:cTn id="2" dur="indefinite" nodeType="mainSeq">
+                <p:childTnLst>
+                  <p:par>
+                    <p:cTn id="3" fill="hold">
+                      <p:stCondLst>
+                        <p:cond delay="indefinite"/>
+                      </p:stCondLst>
+                      <p:childTnLst>
+                        <p:par>
+                          <p:cTn id="4" fill="hold">
+                            <p:stCondLst>
+                              <p:cond delay="0"/>
+                            </p:stCondLst>
+                            <p:childTnLst>
+                              <p:par>
+                                <p:cTn id="5" presetID="1" presetClass="entr" presetSubtype="0" fill="hold" nodeType="clickEffect">
+                                  <p:stCondLst>
+                                    <p:cond delay="0"/>
+                                  </p:stCondLst>
+                                  <p:childTnLst>
+                                    <p:set>
+                                      <p:cBhvr>
+                                        <p:cTn id="6" dur="1" fill="hold">
+                                          <p:stCondLst>
+                                            <p:cond delay="0"/>
+                                          </p:stCondLst>
+                                        </p:cTn>
+                                        <p:tgtEl>
+                                          <p:spTgt spid="3">
+                                            <p:txEl>
+                                              <p:pRg st="0" end="0"/>
+                                            </p:txEl>
+                                          </p:spTgt>
+                                        </p:tgtEl>
+                                        <p:attrNameLst>
+                                          <p:attrName>style.visibility</p:attrName>
+                                        </p:attrNameLst>
+                                      </p:cBhvr>
+                                      <p:to>
+                                        <p:strVal val="visible"/>
+                                      </p:to>
+                                    </p:set>
+                                  </p:childTnLst>
+                                </p:cTn>
+                              </p:par>
+                            </p:childTnLst>
+                          </p:cTn>
+                        </p:par>
+                      </p:childTnLst>
+                    </p:cTn>
+                  </p:par>
+                  <p:par>
+                    <p:cTn id="7" fill="hold">
+                      <p:stCondLst>
+                        <p:cond delay="indefinite"/>
+                      </p:stCondLst>
+                      <p:childTnLst>
+                        <p:par>
+                          <p:cTn id="8" fill="hold">
+                            <p:stCondLst>
+                              <p:cond delay="0"/>
+                            </p:stCondLst>
+                            <p:childTnLst>
+                              <p:par>
+                                <p:cTn id="9" presetID="1" presetClass="entr" presetSubtype="0" fill="hold" nodeType="clickEffect">
+                                  <p:stCondLst>
+                                    <p:cond delay="0"/>
+                                  </p:stCondLst>
+                                  <p:childTnLst>
+                                    <p:set>
+                                      <p:cBhvr>
+                                        <p:cTn id="10" dur="1" fill="hold">
+                                          <p:stCondLst>
+                                            <p:cond delay="0"/>
+                                          </p:stCondLst>
+                                        </p:cTn>
+                                        <p:tgtEl>
+                                          <p:spTgt spid="3">
+                                            <p:txEl>
+                                              <p:pRg st="1" end="1"/>
+                                            </p:txEl>
+                                          </p:spTgt>
+                                        </p:tgtEl>
+                                        <p:attrNameLst>
+                                          <p:attrName>style.visibility</p:attrName>
+                                        </p:attrNameLst>
+                                      </p:cBhvr>
+                                      <p:to>
+                                        <p:strVal val="visible"/>
+                                      </p:to>
+                                    </p:set>
+                                  </p:childTnLst>
+                                </p:cTn>
+                              </p:par>
+                            </p:childTnLst>
+                          </p:cTn>
+                        </p:par>
+                      </p:childTnLst>
+                    </p:cTn>
+                  </p:par>
+                  <p:par>
+                    <p:cTn id="11" fill="hold">
+                      <p:stCondLst>
+                        <p:cond delay="indefinite"/>
+                      </p:stCondLst>
+                      <p:childTnLst>
+                        <p:par>
+                          <p:cTn id="12" fill="hold">
+                            <p:stCondLst>
+                              <p:cond delay="0"/>
+                            </p:stCondLst>
+                            <p:childTnLst>
+                              <p:par>
+                                <p:cTn id="13" presetID="1" presetClass="entr" presetSubtype="0" fill="hold" nodeType="clickEffect">
+                                  <p:stCondLst>
+                                    <p:cond delay="0"/>
+                                  </p:stCondLst>
+                                  <p:childTnLst>
+                                    <p:set>
+                                      <p:cBhvr>
+                                        <p:cTn id="14" dur="1" fill="hold">
+                                          <p:stCondLst>
+                                            <p:cond delay="0"/>
+                                          </p:stCondLst>
+                                        </p:cTn>
+                                        <p:tgtEl>
+                                          <p:spTgt spid="3">
+                                            <p:txEl>
+                                              <p:pRg st="2" end="2"/>
+                                            </p:txEl>
+                                          </p:spTgt>
+                                        </p:tgtEl>
+                                        <p:attrNameLst>
+                                          <p:attrName>style.visibility</p:attrName>
+                                        </p:attrNameLst>
+                                      </p:cBhvr>
+                                      <p:to>
+                                        <p:strVal val="visible"/>
+                                      </p:to>
+                                    </p:set>
+                                  </p:childTnLst>
+                                </p:cTn>
+                              </p:par>
+                            </p:childTnLst>
+                          </p:cTn>
+                        </p:par>
+                      </p:childTnLst>
+                    </p:cTn>
+                  </p:par>
+                  <p:par>
+                    <p:cTn id="15" fill="hold">
+                      <p:stCondLst>
+                        <p:cond delay="indefinite"/>
+                      </p:stCondLst>
+                      <p:childTnLst>
+                        <p:par>
+                          <p:cTn id="16" fill="hold">
+                            <p:stCondLst>
+                              <p:cond delay="0"/>
+                            </p:stCondLst>
+                            <p:childTnLst>
+                              <p:par>
+                                <p:cTn id="17" presetID="1" presetClass="entr" presetSubtype="0" fill="hold" nodeType="clickEffect">
+                                  <p:stCondLst>
+                                    <p:cond delay="0"/>
+                                  </p:stCondLst>
+                                  <p:childTnLst>
+                                    <p:set>
+                                      <p:cBhvr>
+                                        <p:cTn id="18" dur="1" fill="hold">
+                                          <p:stCondLst>
+                                            <p:cond delay="0"/>
+                                          </p:stCondLst>
+                                        </p:cTn>
+                                        <p:tgtEl>
+                                          <p:spTgt spid="3">
+                                            <p:txEl>
+                                              <p:pRg st="3" end="3"/>
+                                            </p:txEl>
+                                          </p:spTgt>
+                                        </p:tgtEl>
+                                        <p:attrNameLst>
+                                          <p:attrName>style.visibility</p:attrName>
+                                        </p:attrNameLst>
+                                      </p:cBhvr>
+                                      <p:to>
+                                        <p:strVal val="visible"/>
+                                      </p:to>
+                                    </p:set>
+                                  </p:childTnLst>
+                                </p:cTn>
+                              </p:par>
+                            </p:childTnLst>
+                          </p:cTn>
+                        </p:par>
+                      </p:childTnLst>
+                    </p:cTn>
+                  </p:par>
+                  <p:par>
+                    <p:cTn id="19" fill="hold">
+                      <p:stCondLst>
+                        <p:cond delay="indefinite"/>
+                      </p:stCondLst>
+                      <p:childTnLst>
+                        <p:par>
+                          <p:cTn id="20" fill="hold">
+                            <p:stCondLst>
+                              <p:cond delay="0"/>
+                            </p:stCondLst>
+                            <p:childTnLst>
+                              <p:par>
+                                <p:cTn id="21" presetID="1" presetClass="entr" presetSubtype="0" fill="hold" nodeType="clickEffect">
+                                  <p:stCondLst>
+                                    <p:cond delay="0"/>
+                                  </p:stCondLst>
+                                  <p:childTnLst>
+                                    <p:set>
+                                      <p:cBhvr>
+                                        <p:cTn id="22" dur="1" fill="hold">
+                                          <p:stCondLst>
+                                            <p:cond delay="0"/>
+                                          </p:stCondLst>
+                                        </p:cTn>
+                                        <p:tgtEl>
+                                          <p:spTgt spid="3">
+                                            <p:txEl>
+                                              <p:pRg st="4" end="4"/>
+                                            </p:txEl>
+                                          </p:spTgt>
+                                        </p:tgtEl>
+                                        <p:attrNameLst>
+                                          <p:attrName>style.visibility</p:attrName>
+                                        </p:attrNameLst>
+                                      </p:cBhvr>
+                                      <p:to>
+                                        <p:strVal val="visible"/>
+                                      </p:to>
+                                    </p:set>
+                                  </p:childTnLst>
+                                </p:cTn>
+                              </p:par>
+                            </p:childTnLst>
+                          </p:cTn>
+                        </p:par>
+                      </p:childTnLst>
+                    </p:cTn>
+                  </p:par>
+                  <p:par>
+                    <p:cTn id="23" fill="hold">
+                      <p:stCondLst>
+                        <p:cond delay="indefinite"/>
+                      </p:stCondLst>
+                      <p:childTnLst>
+                        <p:par>
+                          <p:cTn id="24" fill="hold">
+                            <p:stCondLst>
+                              <p:cond delay="0"/>
+                            </p:stCondLst>
+                            <p:childTnLst>
+                              <p:par>
+                                <p:cTn id="25" presetID="1" presetClass="entr" presetSubtype="0" fill="hold" nodeType="clickEffect">
+                                  <p:stCondLst>
+                                    <p:cond delay="0"/>
+                                  </p:stCondLst>
+                                  <p:childTnLst>
+                                    <p:set>
+                                      <p:cBhvr>
+                                        <p:cTn id="26" dur="1" fill="hold">
+                                          <p:stCondLst>
+                                            <p:cond delay="0"/>
+                                          </p:stCondLst>
+                                        </p:cTn>
+                                        <p:tgtEl>
+                                          <p:spTgt spid="3">
+                                            <p:txEl>
+                                              <p:pRg st="5" end="5"/>
+                                            </p:txEl>
+                                          </p:spTgt>
+                                        </p:tgtEl>
+                                        <p:attrNameLst>
+                                          <p:attrName>style.visibility</p:attrName>
+                                        </p:attrNameLst>
+                                      </p:cBhvr>
+                                      <p:to>
+                                        <p:strVal val="visible"/>
+                                      </p:to>
+                                    </p:set>
+                                  </p:childTnLst>
+                                </p:cTn>
+                              </p:par>
+                            </p:childTnLst>
+                          </p:cTn>
+                        </p:par>
+                      </p:childTnLst>
+                    </p:cTn>
+                  </p:par>
+                </p:childTnLst>
+              </p:cTn>
+              <p:prevCondLst>
+                <p:cond evt="onPrev" delay="0">
+                  <p:tgtEl>
+                    <p:sldTgt/>
+                  </p:tgtEl>
+                </p:cond>
+              </p:prevCondLst>
+              <p:nextCondLst>
+                <p:cond evt="onNext" delay="0">
+                  <p:tgtEl>
+                    <p:sldTgt/>
+                  </p:tgtEl>
+                </p:cond>
+              </p:nextCondLst>
+            </p:seq>
+          </p:childTnLst>
+        </p:cTn>
+      </p:par>
+    </p:tnLst>
+  </p:timing>
+</p:sld>
+</file>
+
+<file path=ppt/slides/slide8.xml><?xml version="1.0" encoding="utf-8"?>
+<p:sld xmlns:a="http://schemas.openxmlformats.org/drawingml/2006/main" xmlns:r="http://schemas.openxmlformats.org/officeDocument/2006/relationships" xmlns:p="http://schemas.openxmlformats.org/presentationml/2006/main">
+  <p:cSld>
+    <p:spTree>
+      <p:nvGrpSpPr>
+        <p:cNvPr id="1" name=""/>
+        <p:cNvGrpSpPr/>
+        <p:nvPr/>
+      </p:nvGrpSpPr>
+      <p:grpSpPr>
+        <a:xfrm>
+          <a:off x="0" y="0"/>
+          <a:ext cx="0" cy="0"/>
+          <a:chOff x="0" y="0"/>
+          <a:chExt cx="0" cy="0"/>
+        </a:xfrm>
+      </p:grpSpPr>
+      <p:sp>
+        <p:nvSpPr>
+          <p:cNvPr id="2" name="Title 1"/>
+          <p:cNvSpPr>
+            <a:spLocks noGrp="1"/>
+          </p:cNvSpPr>
+          <p:nvPr>
+            <p:ph type="title"/>
+          </p:nvPr>
+        </p:nvSpPr>
+        <p:spPr/>
+        <p:txBody>
+          <a:bodyPr/>
+          <a:lstStyle/>
+          <a:p>
+            <a:r>
+              <a:rPr lang="en-AU" dirty="0" smtClean="0"/>
+              <a:t>FAQ</a:t>
+            </a:r>
+            <a:endParaRPr lang="en-AU" dirty="0"/>
+          </a:p>
+        </p:txBody>
+      </p:sp>
+      <p:sp>
+        <p:nvSpPr>
+          <p:cNvPr id="3" name="Text Placeholder 2"/>
+          <p:cNvSpPr>
+            <a:spLocks noGrp="1"/>
+          </p:cNvSpPr>
+          <p:nvPr>
+            <p:ph type="body" sz="quarter" idx="10"/>
+          </p:nvPr>
+        </p:nvSpPr>
+        <p:spPr/>
+        <p:txBody>
+          <a:bodyPr/>
+          <a:lstStyle/>
+          <a:p>
+            <a:pPr marL="0" indent="0">
+              <a:buNone/>
+            </a:pPr>
+            <a:r>
+              <a:rPr lang="en-AU" b="1" dirty="0" smtClean="0">
+                <a:solidFill>
+                  <a:srgbClr val="FF0000"/>
+                </a:solidFill>
+              </a:rPr>
+              <a:t>What </a:t>
+            </a:r>
+            <a:r>
+              <a:rPr lang="en-AU" b="1" dirty="0">
+                <a:solidFill>
+                  <a:srgbClr val="FF0000"/>
+                </a:solidFill>
+              </a:rPr>
+              <a:t>the judging criteria?</a:t>
+            </a:r>
+            <a:endParaRPr lang="en-AU" dirty="0">
+              <a:solidFill>
+                <a:srgbClr val="FF0000"/>
+              </a:solidFill>
+            </a:endParaRPr>
+          </a:p>
+          <a:p>
+            <a:pPr marL="881063" lvl="2" indent="-342900"/>
+            <a:r>
+              <a:rPr lang="en-AU" b="1" dirty="0" smtClean="0"/>
+              <a:t>Collaboration</a:t>
+            </a:r>
+          </a:p>
+          <a:p>
+            <a:pPr marL="881063" lvl="2" indent="-342900"/>
+            <a:r>
+              <a:rPr lang="en-AU" b="1" dirty="0" smtClean="0"/>
+              <a:t>Innovation</a:t>
+            </a:r>
+          </a:p>
+          <a:p>
+            <a:pPr marL="881063" lvl="2" indent="-342900"/>
+            <a:r>
+              <a:rPr lang="en-AU" b="1" dirty="0" smtClean="0"/>
+              <a:t>Presentation </a:t>
+            </a:r>
+          </a:p>
+          <a:p>
+            <a:pPr marL="881063" lvl="2" indent="-342900"/>
+            <a:r>
+              <a:rPr lang="en-AU" b="1" dirty="0" smtClean="0"/>
+              <a:t>working </a:t>
+            </a:r>
+            <a:r>
+              <a:rPr lang="en-AU" b="1" dirty="0"/>
+              <a:t>solution</a:t>
+            </a:r>
+          </a:p>
+          <a:p>
+            <a:endParaRPr lang="en-AU" dirty="0"/>
+          </a:p>
+        </p:txBody>
+      </p:sp>
+    </p:spTree>
+    <p:extLst>
+      <p:ext uri="{BB962C8B-B14F-4D97-AF65-F5344CB8AC3E}">
+        <p14:creationId xmlns:p14="http://schemas.microsoft.com/office/powerpoint/2010/main" val="3228182852"/>
+      </p:ext>
+    </p:extLst>
+  </p:cSld>
+  <p:clrMapOvr>
+    <a:masterClrMapping/>
+  </p:clrMapOvr>
+  <p:transition>
+    <p:fade thruBlk="1"/>
+  </p:transition>
+  <p:timing>
+    <p:tnLst>
+      <p:par>
+        <p:cTn id="1" dur="indefinite" restart="never" nodeType="tmRoot">
+          <p:childTnLst>
+            <p:seq concurrent="1" nextAc="seek">
+              <p:cTn id="2" dur="indefinite" nodeType="mainSeq">
+                <p:childTnLst>
+                  <p:par>
+                    <p:cTn id="3" fill="hold">
+                      <p:stCondLst>
+                        <p:cond delay="indefinite"/>
+                      </p:stCondLst>
+                      <p:childTnLst>
+                        <p:par>
+                          <p:cTn id="4" fill="hold">
+                            <p:stCondLst>
+                              <p:cond delay="0"/>
+                            </p:stCondLst>
+                            <p:childTnLst>
+                              <p:par>
+                                <p:cTn id="5" presetID="1" presetClass="entr" presetSubtype="0" fill="hold" nodeType="clickEffect">
+                                  <p:stCondLst>
+                                    <p:cond delay="0"/>
+                                  </p:stCondLst>
+                                  <p:childTnLst>
+                                    <p:set>
+                                      <p:cBhvr>
+                                        <p:cTn id="6" dur="1" fill="hold">
+                                          <p:stCondLst>
+                                            <p:cond delay="0"/>
+                                          </p:stCondLst>
+                                        </p:cTn>
+                                        <p:tgtEl>
+                                          <p:spTgt spid="3">
+                                            <p:txEl>
+                                              <p:pRg st="0" end="0"/>
+                                            </p:txEl>
+                                          </p:spTgt>
+                                        </p:tgtEl>
+                                        <p:attrNameLst>
+                                          <p:attrName>style.visibility</p:attrName>
+                                        </p:attrNameLst>
+                                      </p:cBhvr>
+                                      <p:to>
+                                        <p:strVal val="visible"/>
+                                      </p:to>
+                                    </p:set>
+                                  </p:childTnLst>
+                                </p:cTn>
+                              </p:par>
+                            </p:childTnLst>
+                          </p:cTn>
+                        </p:par>
+                      </p:childTnLst>
+                    </p:cTn>
+                  </p:par>
+                  <p:par>
+                    <p:cTn id="7" fill="hold">
+                      <p:stCondLst>
+                        <p:cond delay="indefinite"/>
+                      </p:stCondLst>
+                      <p:childTnLst>
+                        <p:par>
+                          <p:cTn id="8" fill="hold">
+                            <p:stCondLst>
+                              <p:cond delay="0"/>
+                            </p:stCondLst>
+                            <p:childTnLst>
+                              <p:par>
+                                <p:cTn id="9" presetID="1" presetClass="entr" presetSubtype="0" fill="hold" nodeType="clickEffect">
+                                  <p:stCondLst>
+                                    <p:cond delay="0"/>
+                                  </p:stCondLst>
+                                  <p:childTnLst>
+                                    <p:set>
+                                      <p:cBhvr>
+                                        <p:cTn id="10" dur="1" fill="hold">
+                                          <p:stCondLst>
+                                            <p:cond delay="0"/>
+                                          </p:stCondLst>
+                                        </p:cTn>
+                                        <p:tgtEl>
+                                          <p:spTgt spid="3">
+                                            <p:txEl>
+                                              <p:pRg st="1" end="1"/>
+                                            </p:txEl>
+                                          </p:spTgt>
+                                        </p:tgtEl>
+                                        <p:attrNameLst>
+                                          <p:attrName>style.visibility</p:attrName>
+                                        </p:attrNameLst>
+                                      </p:cBhvr>
+                                      <p:to>
+                                        <p:strVal val="visible"/>
+                                      </p:to>
+                                    </p:set>
+                                  </p:childTnLst>
+                                </p:cTn>
+                              </p:par>
+                              <p:par>
+                                <p:cTn id="11" presetID="1" presetClass="entr" presetSubtype="0" fill="hold" nodeType="withEffect">
+                                  <p:stCondLst>
+                                    <p:cond delay="0"/>
+                                  </p:stCondLst>
+                                  <p:childTnLst>
+                                    <p:set>
+                                      <p:cBhvr>
+                                        <p:cTn id="12" dur="1" fill="hold">
+                                          <p:stCondLst>
+                                            <p:cond delay="0"/>
+                                          </p:stCondLst>
+                                        </p:cTn>
+                                        <p:tgtEl>
+                                          <p:spTgt spid="3">
+                                            <p:txEl>
+                                              <p:pRg st="2" end="2"/>
+                                            </p:txEl>
+                                          </p:spTgt>
+                                        </p:tgtEl>
+                                        <p:attrNameLst>
+                                          <p:attrName>style.visibility</p:attrName>
+                                        </p:attrNameLst>
+                                      </p:cBhvr>
+                                      <p:to>
+                                        <p:strVal val="visible"/>
+                                      </p:to>
+                                    </p:set>
+                                  </p:childTnLst>
+                                </p:cTn>
+                              </p:par>
+                              <p:par>
+                                <p:cTn id="13" presetID="1" presetClass="entr" presetSubtype="0" fill="hold" nodeType="withEffect">
+                                  <p:stCondLst>
+                                    <p:cond delay="0"/>
+                                  </p:stCondLst>
+                                  <p:childTnLst>
+                                    <p:set>
+                                      <p:cBhvr>
+                                        <p:cTn id="14" dur="1" fill="hold">
+                                          <p:stCondLst>
+                                            <p:cond delay="0"/>
+                                          </p:stCondLst>
+                                        </p:cTn>
+                                        <p:tgtEl>
+                                          <p:spTgt spid="3">
+                                            <p:txEl>
+                                              <p:pRg st="3" end="3"/>
+                                            </p:txEl>
+                                          </p:spTgt>
+                                        </p:tgtEl>
+                                        <p:attrNameLst>
+                                          <p:attrName>style.visibility</p:attrName>
+                                        </p:attrNameLst>
+                                      </p:cBhvr>
+                                      <p:to>
+                                        <p:strVal val="visible"/>
+                                      </p:to>
+                                    </p:set>
+                                  </p:childTnLst>
+                                </p:cTn>
+                              </p:par>
+                              <p:par>
+                                <p:cTn id="15" presetID="1" presetClass="entr" presetSubtype="0" fill="hold" nodeType="withEffect">
+                                  <p:stCondLst>
+                                    <p:cond delay="0"/>
+                                  </p:stCondLst>
+                                  <p:childTnLst>
+                                    <p:set>
+                                      <p:cBhvr>
+                                        <p:cTn id="16" dur="1" fill="hold">
+                                          <p:stCondLst>
+                                            <p:cond delay="0"/>
+                                          </p:stCondLst>
+                                        </p:cTn>
+                                        <p:tgtEl>
+                                          <p:spTgt spid="3">
+                                            <p:txEl>
+                                              <p:pRg st="4" end="4"/>
+                                            </p:txEl>
+                                          </p:spTgt>
+                                        </p:tgtEl>
+                                        <p:attrNameLst>
+                                          <p:attrName>style.visibility</p:attrName>
+                                        </p:attrNameLst>
+                                      </p:cBhvr>
+                                      <p:to>
+                                        <p:strVal val="visible"/>
+                                      </p:to>
+                                    </p:set>
+                                  </p:childTnLst>
+                                </p:cTn>
+                              </p:par>
+                            </p:childTnLst>
+                          </p:cTn>
+                        </p:par>
+                      </p:childTnLst>
+                    </p:cTn>
+                  </p:par>
+                </p:childTnLst>
+              </p:cTn>
+              <p:prevCondLst>
+                <p:cond evt="onPrev" delay="0">
+                  <p:tgtEl>
+                    <p:sldTgt/>
+                  </p:tgtEl>
+                </p:cond>
+              </p:prevCondLst>
+              <p:nextCondLst>
+                <p:cond evt="onNext" delay="0">
+                  <p:tgtEl>
+                    <p:sldTgt/>
+                  </p:tgtEl>
+                </p:cond>
+              </p:nextCondLst>
+            </p:seq>
+          </p:childTnLst>
+        </p:cTn>
+      </p:par>
+    </p:tnLst>
+  </p:timing>
+</p:sld>
+</file>
+
+<file path=ppt/slides/slide9.xml><?xml version="1.0" encoding="utf-8"?>
+<p:sld xmlns:a="http://schemas.openxmlformats.org/drawingml/2006/main" xmlns:r="http://schemas.openxmlformats.org/officeDocument/2006/relationships" xmlns:p="http://schemas.openxmlformats.org/presentationml/2006/main">
+  <p:cSld>
+    <p:spTree>
+      <p:nvGrpSpPr>
+        <p:cNvPr id="1" name=""/>
+        <p:cNvGrpSpPr/>
+        <p:nvPr/>
+      </p:nvGrpSpPr>
+      <p:grpSpPr>
+        <a:xfrm>
+          <a:off x="0" y="0"/>
+          <a:ext cx="0" cy="0"/>
+          <a:chOff x="0" y="0"/>
+          <a:chExt cx="0" cy="0"/>
+        </a:xfrm>
+      </p:grpSpPr>
+    </p:spTree>
+    <p:extLst>
+      <p:ext uri="{BB962C8B-B14F-4D97-AF65-F5344CB8AC3E}">
+        <p14:creationId xmlns:p14="http://schemas.microsoft.com/office/powerpoint/2010/main" val="3557732727"/>
+      </p:ext>
+    </p:extLst>
+  </p:cSld>
+  <p:clrMapOvr>
+    <a:masterClrMapping/>
+  </p:clrMapOvr>
+  <p:transition>
+    <p:fade thruBlk="1"/>
+  </p:transition>
+  <p:timing>
+    <p:tnLst>
+      <p:par>
+        <p:cTn id="1" dur="indefinite" restart="never" nodeType="tmRoot"/>
       </p:par>
     </p:tnLst>
   </p:timing>
@@ -6090,6 +7045,21 @@
 </file>
 
 <file path=customXml/item1.xml><?xml version="1.0" encoding="utf-8"?>
+<p:properties xmlns:p="http://schemas.microsoft.com/office/2006/metadata/properties" xmlns:xsi="http://www.w3.org/2001/XMLSchema-instance">
+  <documentManagement/>
+</p:properties>
+</file>
+
+<file path=customXml/item2.xml><?xml version="1.0" encoding="utf-8"?>
+<?mso-contentType ?>
+<FormTemplates xmlns="http://schemas.microsoft.com/sharepoint/v3/contenttype/forms">
+  <Display>DocumentLibraryForm</Display>
+  <Edit>DocumentLibraryForm</Edit>
+  <New>DocumentLibraryForm</New>
+</FormTemplates>
+</file>
+
+<file path=customXml/item3.xml><?xml version="1.0" encoding="utf-8"?>
 <?mso-contentType ?>
 <rca:RCAuthoringProperties xmlns:rca="urn:sharePointPublishingRcaProperties">
   <rca:Converter rca:guid="6dfdc5b4-2a28-4a06-b0c6-ad3901e3a807">
@@ -6105,21 +7075,6 @@
     <rca:property rca:type="ConverterSpecificSettings"/>
   </rca:Converter>
 </rca:RCAuthoringProperties>
-</file>
-
-<file path=customXml/item2.xml><?xml version="1.0" encoding="utf-8"?>
-<?mso-contentType ?>
-<FormTemplates xmlns="http://schemas.microsoft.com/sharepoint/v3/contenttype/forms">
-  <Display>DocumentLibraryForm</Display>
-  <Edit>DocumentLibraryForm</Edit>
-  <New>DocumentLibraryForm</New>
-</FormTemplates>
-</file>
-
-<file path=customXml/item3.xml><?xml version="1.0" encoding="utf-8"?>
-<p:properties xmlns:p="http://schemas.microsoft.com/office/2006/metadata/properties" xmlns:xsi="http://www.w3.org/2001/XMLSchema-instance">
-  <documentManagement/>
-</p:properties>
 </file>
 
 <file path=customXml/item4.xml><?xml version="1.0" encoding="utf-8"?>
@@ -6172,9 +7127,15 @@
 </file>
 
 <file path=customXml/itemProps1.xml><?xml version="1.0" encoding="utf-8"?>
-<ds:datastoreItem xmlns:ds="http://schemas.openxmlformats.org/officeDocument/2006/customXml" ds:itemID="{37DE6E84-255A-45E8-8353-BCD6A4998E02}">
+<ds:datastoreItem xmlns:ds="http://schemas.openxmlformats.org/officeDocument/2006/customXml" ds:itemID="{BDEC00FF-5F1B-415D-9C89-173832172D95}">
   <ds:schemaRefs>
-    <ds:schemaRef ds:uri="urn:sharePointPublishingRcaProperties"/>
+    <ds:schemaRef ds:uri="http://purl.org/dc/dcmitype/"/>
+    <ds:schemaRef ds:uri="http://purl.org/dc/elements/1.1/"/>
+    <ds:schemaRef ds:uri="http://schemas.microsoft.com/office/2006/documentManagement/types"/>
+    <ds:schemaRef ds:uri="http://schemas.openxmlformats.org/package/2006/metadata/core-properties"/>
+    <ds:schemaRef ds:uri="http://schemas.microsoft.com/office/2006/metadata/properties"/>
+    <ds:schemaRef ds:uri="http://www.w3.org/XML/1998/namespace"/>
+    <ds:schemaRef ds:uri="http://purl.org/dc/terms/"/>
   </ds:schemaRefs>
 </ds:datastoreItem>
 </file>
@@ -6188,15 +7149,9 @@
 </file>
 
 <file path=customXml/itemProps3.xml><?xml version="1.0" encoding="utf-8"?>
-<ds:datastoreItem xmlns:ds="http://schemas.openxmlformats.org/officeDocument/2006/customXml" ds:itemID="{BDEC00FF-5F1B-415D-9C89-173832172D95}">
+<ds:datastoreItem xmlns:ds="http://schemas.openxmlformats.org/officeDocument/2006/customXml" ds:itemID="{37DE6E84-255A-45E8-8353-BCD6A4998E02}">
   <ds:schemaRefs>
-    <ds:schemaRef ds:uri="http://purl.org/dc/dcmitype/"/>
-    <ds:schemaRef ds:uri="http://purl.org/dc/elements/1.1/"/>
-    <ds:schemaRef ds:uri="http://schemas.microsoft.com/office/2006/documentManagement/types"/>
-    <ds:schemaRef ds:uri="http://schemas.openxmlformats.org/package/2006/metadata/core-properties"/>
-    <ds:schemaRef ds:uri="http://schemas.microsoft.com/office/2006/metadata/properties"/>
-    <ds:schemaRef ds:uri="http://www.w3.org/XML/1998/namespace"/>
-    <ds:schemaRef ds:uri="http://purl.org/dc/terms/"/>
+    <ds:schemaRef ds:uri="urn:sharePointPublishingRcaProperties"/>
   </ds:schemaRefs>
 </ds:datastoreItem>
 </file>

</xml_diff>